<commit_message>
fix bug: re-do normalization,scaling... for subsets
</commit_message>
<xml_diff>
--- a/WorkReport.pptx
+++ b/WorkReport.pptx
@@ -5,7 +5,7 @@
     <p:sldMasterId id="2147483672" r:id="rId1"/>
   </p:sldMasterIdLst>
   <p:notesMasterIdLst>
-    <p:notesMasterId r:id="rId18"/>
+    <p:notesMasterId r:id="rId20"/>
   </p:notesMasterIdLst>
   <p:sldIdLst>
     <p:sldId id="256" r:id="rId2"/>
@@ -18,12 +18,14 @@
     <p:sldId id="261" r:id="rId9"/>
     <p:sldId id="270" r:id="rId10"/>
     <p:sldId id="269" r:id="rId11"/>
-    <p:sldId id="262" r:id="rId12"/>
-    <p:sldId id="263" r:id="rId13"/>
-    <p:sldId id="264" r:id="rId14"/>
-    <p:sldId id="265" r:id="rId15"/>
-    <p:sldId id="266" r:id="rId16"/>
-    <p:sldId id="267" r:id="rId17"/>
+    <p:sldId id="272" r:id="rId12"/>
+    <p:sldId id="273" r:id="rId13"/>
+    <p:sldId id="262" r:id="rId14"/>
+    <p:sldId id="263" r:id="rId15"/>
+    <p:sldId id="264" r:id="rId16"/>
+    <p:sldId id="265" r:id="rId17"/>
+    <p:sldId id="266" r:id="rId18"/>
+    <p:sldId id="267" r:id="rId19"/>
   </p:sldIdLst>
   <p:sldSz cx="12192000" cy="6858000"/>
   <p:notesSz cx="6858000" cy="9144000"/>
@@ -3673,7 +3675,7 @@
         <p:spPr>
           <a:xfrm>
             <a:off x="0" y="0"/>
-            <a:ext cx="2639505" cy="369332"/>
+            <a:ext cx="10148740" cy="369332"/>
           </a:xfrm>
           <a:prstGeom prst="rect">
             <a:avLst/>
@@ -3688,7 +3690,22 @@
           <a:p>
             <a:r>
               <a:rPr lang="en-US" b="1" dirty="0"/>
-              <a:t>GSE200996: PENCIL result</a:t>
+              <a:t>GSE200996: PENCIL result (</a:t>
+            </a:r>
+            <a:r>
+              <a:rPr lang="en-US" b="1" dirty="0">
+                <a:solidFill>
+                  <a:srgbClr val="FF0000"/>
+                </a:solidFill>
+                <a:highlight>
+                  <a:srgbClr val="FFFF00"/>
+                </a:highlight>
+              </a:rPr>
+              <a:t>Incorrect: did not re-do normalization, scaling and PCA for the subset of data</a:t>
+            </a:r>
+            <a:r>
+              <a:rPr lang="en-US" b="1" dirty="0"/>
+              <a:t>)</a:t>
             </a:r>
           </a:p>
         </p:txBody>
@@ -4178,10 +4195,486 @@
           </a:p>
         </p:txBody>
       </p:sp>
+      <p:sp>
+        <p:nvSpPr>
+          <p:cNvPr id="11" name="TextBox 10">
+            <a:extLst>
+              <a:ext uri="{FF2B5EF4-FFF2-40B4-BE49-F238E27FC236}">
+                <a16:creationId xmlns:a16="http://schemas.microsoft.com/office/drawing/2014/main" id="{1F25C690-F919-2C24-FF7B-69CF25B74724}"/>
+              </a:ext>
+            </a:extLst>
+          </p:cNvPr>
+          <p:cNvSpPr txBox="1"/>
+          <p:nvPr/>
+        </p:nvSpPr>
+        <p:spPr>
+          <a:xfrm>
+            <a:off x="0" y="0"/>
+            <a:ext cx="4433778" cy="369332"/>
+          </a:xfrm>
+          <a:prstGeom prst="rect">
+            <a:avLst/>
+          </a:prstGeom>
+          <a:noFill/>
+        </p:spPr>
+        <p:txBody>
+          <a:bodyPr wrap="none" rtlCol="0">
+            <a:spAutoFit/>
+          </a:bodyPr>
+          <a:lstStyle/>
+          <a:p>
+            <a:r>
+              <a:rPr lang="en-US" b="1" dirty="0"/>
+              <a:t>GSE200996: PENCIL result (</a:t>
+            </a:r>
+            <a:r>
+              <a:rPr lang="en-US" b="1" dirty="0">
+                <a:solidFill>
+                  <a:srgbClr val="FF0000"/>
+                </a:solidFill>
+                <a:highlight>
+                  <a:srgbClr val="FFFF00"/>
+                </a:highlight>
+              </a:rPr>
+              <a:t>corrected result</a:t>
+            </a:r>
+            <a:r>
+              <a:rPr lang="en-US" b="1" dirty="0"/>
+              <a:t>)</a:t>
+            </a:r>
+          </a:p>
+        </p:txBody>
+      </p:sp>
+      <p:sp>
+        <p:nvSpPr>
+          <p:cNvPr id="20" name="TextBox 19">
+            <a:extLst>
+              <a:ext uri="{FF2B5EF4-FFF2-40B4-BE49-F238E27FC236}">
+                <a16:creationId xmlns:a16="http://schemas.microsoft.com/office/drawing/2014/main" id="{DD51913F-6366-9848-8726-687278A3C452}"/>
+              </a:ext>
+            </a:extLst>
+          </p:cNvPr>
+          <p:cNvSpPr txBox="1"/>
+          <p:nvPr/>
+        </p:nvSpPr>
+        <p:spPr>
+          <a:xfrm>
+            <a:off x="1159367" y="3244334"/>
+            <a:ext cx="1314784" cy="369332"/>
+          </a:xfrm>
+          <a:prstGeom prst="rect">
+            <a:avLst/>
+          </a:prstGeom>
+          <a:noFill/>
+        </p:spPr>
+        <p:txBody>
+          <a:bodyPr wrap="none" rtlCol="0">
+            <a:spAutoFit/>
+          </a:bodyPr>
+          <a:lstStyle/>
+          <a:p>
+            <a:r>
+              <a:rPr lang="en-US" dirty="0"/>
+              <a:t>Tissue CD8T</a:t>
+            </a:r>
+          </a:p>
+        </p:txBody>
+      </p:sp>
+      <p:sp>
+        <p:nvSpPr>
+          <p:cNvPr id="21" name="TextBox 20">
+            <a:extLst>
+              <a:ext uri="{FF2B5EF4-FFF2-40B4-BE49-F238E27FC236}">
+                <a16:creationId xmlns:a16="http://schemas.microsoft.com/office/drawing/2014/main" id="{8C2981F6-A234-672E-CF26-9BDF1CE6630E}"/>
+              </a:ext>
+            </a:extLst>
+          </p:cNvPr>
+          <p:cNvSpPr txBox="1"/>
+          <p:nvPr/>
+        </p:nvSpPr>
+        <p:spPr>
+          <a:xfrm>
+            <a:off x="8986890" y="3244334"/>
+            <a:ext cx="1406154" cy="369332"/>
+          </a:xfrm>
+          <a:prstGeom prst="rect">
+            <a:avLst/>
+          </a:prstGeom>
+          <a:noFill/>
+        </p:spPr>
+        <p:txBody>
+          <a:bodyPr wrap="none" rtlCol="0">
+            <a:spAutoFit/>
+          </a:bodyPr>
+          <a:lstStyle/>
+          <a:p>
+            <a:r>
+              <a:rPr lang="en-US" dirty="0"/>
+              <a:t>Tissue B cells</a:t>
+            </a:r>
+          </a:p>
+        </p:txBody>
+      </p:sp>
+      <p:sp>
+        <p:nvSpPr>
+          <p:cNvPr id="22" name="TextBox 21">
+            <a:extLst>
+              <a:ext uri="{FF2B5EF4-FFF2-40B4-BE49-F238E27FC236}">
+                <a16:creationId xmlns:a16="http://schemas.microsoft.com/office/drawing/2014/main" id="{8208E409-B222-158F-E29E-3A41B9CEE149}"/>
+              </a:ext>
+            </a:extLst>
+          </p:cNvPr>
+          <p:cNvSpPr txBox="1"/>
+          <p:nvPr/>
+        </p:nvSpPr>
+        <p:spPr>
+          <a:xfrm>
+            <a:off x="5128591" y="3244334"/>
+            <a:ext cx="1314784" cy="369332"/>
+          </a:xfrm>
+          <a:prstGeom prst="rect">
+            <a:avLst/>
+          </a:prstGeom>
+          <a:noFill/>
+        </p:spPr>
+        <p:txBody>
+          <a:bodyPr wrap="none" rtlCol="0">
+            <a:spAutoFit/>
+          </a:bodyPr>
+          <a:lstStyle/>
+          <a:p>
+            <a:r>
+              <a:rPr lang="en-US" dirty="0"/>
+              <a:t>Tissue CD4T</a:t>
+            </a:r>
+          </a:p>
+        </p:txBody>
+      </p:sp>
+      <p:sp>
+        <p:nvSpPr>
+          <p:cNvPr id="23" name="TextBox 22">
+            <a:extLst>
+              <a:ext uri="{FF2B5EF4-FFF2-40B4-BE49-F238E27FC236}">
+                <a16:creationId xmlns:a16="http://schemas.microsoft.com/office/drawing/2014/main" id="{A603790F-C887-C2C7-4FBA-18DB8637AE9C}"/>
+              </a:ext>
+            </a:extLst>
+          </p:cNvPr>
+          <p:cNvSpPr txBox="1"/>
+          <p:nvPr/>
+        </p:nvSpPr>
+        <p:spPr>
+          <a:xfrm>
+            <a:off x="1159367" y="6385777"/>
+            <a:ext cx="1297150" cy="369332"/>
+          </a:xfrm>
+          <a:prstGeom prst="rect">
+            <a:avLst/>
+          </a:prstGeom>
+          <a:noFill/>
+        </p:spPr>
+        <p:txBody>
+          <a:bodyPr wrap="none" rtlCol="0">
+            <a:spAutoFit/>
+          </a:bodyPr>
+          <a:lstStyle/>
+          <a:p>
+            <a:r>
+              <a:rPr lang="en-US" dirty="0"/>
+              <a:t>PBMC CD8T</a:t>
+            </a:r>
+          </a:p>
+        </p:txBody>
+      </p:sp>
+      <p:sp>
+        <p:nvSpPr>
+          <p:cNvPr id="24" name="TextBox 23">
+            <a:extLst>
+              <a:ext uri="{FF2B5EF4-FFF2-40B4-BE49-F238E27FC236}">
+                <a16:creationId xmlns:a16="http://schemas.microsoft.com/office/drawing/2014/main" id="{DD5C0E66-6F13-4E52-4F4A-53E7156DE531}"/>
+              </a:ext>
+            </a:extLst>
+          </p:cNvPr>
+          <p:cNvSpPr txBox="1"/>
+          <p:nvPr/>
+        </p:nvSpPr>
+        <p:spPr>
+          <a:xfrm>
+            <a:off x="8986890" y="6385777"/>
+            <a:ext cx="1406154" cy="369332"/>
+          </a:xfrm>
+          <a:prstGeom prst="rect">
+            <a:avLst/>
+          </a:prstGeom>
+          <a:noFill/>
+        </p:spPr>
+        <p:txBody>
+          <a:bodyPr wrap="none" rtlCol="0">
+            <a:spAutoFit/>
+          </a:bodyPr>
+          <a:lstStyle/>
+          <a:p>
+            <a:r>
+              <a:rPr lang="en-US" dirty="0"/>
+              <a:t>PBMC B cells</a:t>
+            </a:r>
+          </a:p>
+        </p:txBody>
+      </p:sp>
+      <p:sp>
+        <p:nvSpPr>
+          <p:cNvPr id="25" name="TextBox 24">
+            <a:extLst>
+              <a:ext uri="{FF2B5EF4-FFF2-40B4-BE49-F238E27FC236}">
+                <a16:creationId xmlns:a16="http://schemas.microsoft.com/office/drawing/2014/main" id="{C17B9338-3A5D-3361-9AB7-1DD42F94811A}"/>
+              </a:ext>
+            </a:extLst>
+          </p:cNvPr>
+          <p:cNvSpPr txBox="1"/>
+          <p:nvPr/>
+        </p:nvSpPr>
+        <p:spPr>
+          <a:xfrm>
+            <a:off x="5128591" y="6385777"/>
+            <a:ext cx="1314784" cy="369332"/>
+          </a:xfrm>
+          <a:prstGeom prst="rect">
+            <a:avLst/>
+          </a:prstGeom>
+          <a:noFill/>
+        </p:spPr>
+        <p:txBody>
+          <a:bodyPr wrap="none" rtlCol="0">
+            <a:spAutoFit/>
+          </a:bodyPr>
+          <a:lstStyle/>
+          <a:p>
+            <a:r>
+              <a:rPr lang="en-US" dirty="0"/>
+              <a:t>PBMC CD4T</a:t>
+            </a:r>
+          </a:p>
+        </p:txBody>
+      </p:sp>
+      <p:pic>
+        <p:nvPicPr>
+          <p:cNvPr id="5" name="Picture 4">
+            <a:extLst>
+              <a:ext uri="{FF2B5EF4-FFF2-40B4-BE49-F238E27FC236}">
+                <a16:creationId xmlns:a16="http://schemas.microsoft.com/office/drawing/2014/main" id="{CF3998F9-4DE6-590F-3D97-17388C8FEC26}"/>
+              </a:ext>
+            </a:extLst>
+          </p:cNvPr>
+          <p:cNvPicPr>
+            <a:picLocks noChangeAspect="1"/>
+          </p:cNvPicPr>
+          <p:nvPr/>
+        </p:nvPicPr>
+        <p:blipFill>
+          <a:blip r:embed="rId2">
+            <a:extLst>
+              <a:ext uri="{28A0092B-C50C-407E-A947-70E740481C1C}">
+                <a14:useLocalDpi xmlns:a14="http://schemas.microsoft.com/office/drawing/2010/main" val="0"/>
+              </a:ext>
+            </a:extLst>
+          </a:blip>
+          <a:stretch>
+            <a:fillRect/>
+          </a:stretch>
+        </p:blipFill>
+        <p:spPr>
+          <a:xfrm>
+            <a:off x="328840" y="501134"/>
+            <a:ext cx="3077155" cy="2743200"/>
+          </a:xfrm>
+          <a:prstGeom prst="rect">
+            <a:avLst/>
+          </a:prstGeom>
+        </p:spPr>
+      </p:pic>
+      <p:pic>
+        <p:nvPicPr>
+          <p:cNvPr id="8" name="Picture 7">
+            <a:extLst>
+              <a:ext uri="{FF2B5EF4-FFF2-40B4-BE49-F238E27FC236}">
+                <a16:creationId xmlns:a16="http://schemas.microsoft.com/office/drawing/2014/main" id="{C2D2C60A-EE81-1C65-3B38-6DEA3EA83413}"/>
+              </a:ext>
+            </a:extLst>
+          </p:cNvPr>
+          <p:cNvPicPr>
+            <a:picLocks noChangeAspect="1"/>
+          </p:cNvPicPr>
+          <p:nvPr/>
+        </p:nvPicPr>
+        <p:blipFill>
+          <a:blip r:embed="rId3">
+            <a:extLst>
+              <a:ext uri="{28A0092B-C50C-407E-A947-70E740481C1C}">
+                <a14:useLocalDpi xmlns:a14="http://schemas.microsoft.com/office/drawing/2010/main" val="0"/>
+              </a:ext>
+            </a:extLst>
+          </a:blip>
+          <a:stretch>
+            <a:fillRect/>
+          </a:stretch>
+        </p:blipFill>
+        <p:spPr>
+          <a:xfrm>
+            <a:off x="4347144" y="501134"/>
+            <a:ext cx="3062177" cy="2743200"/>
+          </a:xfrm>
+          <a:prstGeom prst="rect">
+            <a:avLst/>
+          </a:prstGeom>
+        </p:spPr>
+      </p:pic>
+      <p:pic>
+        <p:nvPicPr>
+          <p:cNvPr id="10" name="Picture 9">
+            <a:extLst>
+              <a:ext uri="{FF2B5EF4-FFF2-40B4-BE49-F238E27FC236}">
+                <a16:creationId xmlns:a16="http://schemas.microsoft.com/office/drawing/2014/main" id="{8F4E02E1-811C-D2AF-2C7F-6557989D9195}"/>
+              </a:ext>
+            </a:extLst>
+          </p:cNvPr>
+          <p:cNvPicPr>
+            <a:picLocks noChangeAspect="1"/>
+          </p:cNvPicPr>
+          <p:nvPr/>
+        </p:nvPicPr>
+        <p:blipFill>
+          <a:blip r:embed="rId4">
+            <a:extLst>
+              <a:ext uri="{28A0092B-C50C-407E-A947-70E740481C1C}">
+                <a14:useLocalDpi xmlns:a14="http://schemas.microsoft.com/office/drawing/2010/main" val="0"/>
+              </a:ext>
+            </a:extLst>
+          </a:blip>
+          <a:stretch>
+            <a:fillRect/>
+          </a:stretch>
+        </p:blipFill>
+        <p:spPr>
+          <a:xfrm>
+            <a:off x="8350469" y="501134"/>
+            <a:ext cx="3046228" cy="2743200"/>
+          </a:xfrm>
+          <a:prstGeom prst="rect">
+            <a:avLst/>
+          </a:prstGeom>
+        </p:spPr>
+      </p:pic>
+      <p:pic>
+        <p:nvPicPr>
+          <p:cNvPr id="14" name="Picture 13">
+            <a:extLst>
+              <a:ext uri="{FF2B5EF4-FFF2-40B4-BE49-F238E27FC236}">
+                <a16:creationId xmlns:a16="http://schemas.microsoft.com/office/drawing/2014/main" id="{D2837B73-B8EE-D635-850E-C618739E51AA}"/>
+              </a:ext>
+            </a:extLst>
+          </p:cNvPr>
+          <p:cNvPicPr>
+            <a:picLocks noChangeAspect="1"/>
+          </p:cNvPicPr>
+          <p:nvPr/>
+        </p:nvPicPr>
+        <p:blipFill>
+          <a:blip r:embed="rId5">
+            <a:extLst>
+              <a:ext uri="{28A0092B-C50C-407E-A947-70E740481C1C}">
+                <a14:useLocalDpi xmlns:a14="http://schemas.microsoft.com/office/drawing/2010/main" val="0"/>
+              </a:ext>
+            </a:extLst>
+          </a:blip>
+          <a:stretch>
+            <a:fillRect/>
+          </a:stretch>
+        </p:blipFill>
+        <p:spPr>
+          <a:xfrm>
+            <a:off x="328840" y="3657342"/>
+            <a:ext cx="3054202" cy="2743200"/>
+          </a:xfrm>
+          <a:prstGeom prst="rect">
+            <a:avLst/>
+          </a:prstGeom>
+        </p:spPr>
+      </p:pic>
+      <p:pic>
+        <p:nvPicPr>
+          <p:cNvPr id="18" name="Picture 17">
+            <a:extLst>
+              <a:ext uri="{FF2B5EF4-FFF2-40B4-BE49-F238E27FC236}">
+                <a16:creationId xmlns:a16="http://schemas.microsoft.com/office/drawing/2014/main" id="{E1A986D0-38DA-9164-CB4A-1747F9F4BC80}"/>
+              </a:ext>
+            </a:extLst>
+          </p:cNvPr>
+          <p:cNvPicPr>
+            <a:picLocks noChangeAspect="1"/>
+          </p:cNvPicPr>
+          <p:nvPr/>
+        </p:nvPicPr>
+        <p:blipFill>
+          <a:blip r:embed="rId6">
+            <a:extLst>
+              <a:ext uri="{28A0092B-C50C-407E-A947-70E740481C1C}">
+                <a14:useLocalDpi xmlns:a14="http://schemas.microsoft.com/office/drawing/2010/main" val="0"/>
+              </a:ext>
+            </a:extLst>
+          </a:blip>
+          <a:stretch>
+            <a:fillRect/>
+          </a:stretch>
+        </p:blipFill>
+        <p:spPr>
+          <a:xfrm>
+            <a:off x="4336589" y="3657342"/>
+            <a:ext cx="3060333" cy="2743200"/>
+          </a:xfrm>
+          <a:prstGeom prst="rect">
+            <a:avLst/>
+          </a:prstGeom>
+        </p:spPr>
+      </p:pic>
+      <p:pic>
+        <p:nvPicPr>
+          <p:cNvPr id="27" name="Picture 26">
+            <a:extLst>
+              <a:ext uri="{FF2B5EF4-FFF2-40B4-BE49-F238E27FC236}">
+                <a16:creationId xmlns:a16="http://schemas.microsoft.com/office/drawing/2014/main" id="{B9F69C42-C5CD-F029-3ACE-3F2A7F8D2C6B}"/>
+              </a:ext>
+            </a:extLst>
+          </p:cNvPr>
+          <p:cNvPicPr>
+            <a:picLocks noChangeAspect="1"/>
+          </p:cNvPicPr>
+          <p:nvPr/>
+        </p:nvPicPr>
+        <p:blipFill>
+          <a:blip r:embed="rId7">
+            <a:extLst>
+              <a:ext uri="{28A0092B-C50C-407E-A947-70E740481C1C}">
+                <a14:useLocalDpi xmlns:a14="http://schemas.microsoft.com/office/drawing/2010/main" val="0"/>
+              </a:ext>
+            </a:extLst>
+          </a:blip>
+          <a:stretch>
+            <a:fillRect/>
+          </a:stretch>
+        </p:blipFill>
+        <p:spPr>
+          <a:xfrm>
+            <a:off x="8350469" y="3657342"/>
+            <a:ext cx="3003331" cy="2743200"/>
+          </a:xfrm>
+          <a:prstGeom prst="rect">
+            <a:avLst/>
+          </a:prstGeom>
+        </p:spPr>
+      </p:pic>
     </p:spTree>
     <p:extLst>
       <p:ext uri="{BB962C8B-B14F-4D97-AF65-F5344CB8AC3E}">
-        <p14:creationId xmlns:p14="http://schemas.microsoft.com/office/powerpoint/2010/main" val="3583755307"/>
+        <p14:creationId xmlns:p14="http://schemas.microsoft.com/office/powerpoint/2010/main" val="3147368616"/>
       </p:ext>
     </p:extLst>
   </p:cSld>
@@ -4237,10 +4730,291 @@
           </a:p>
         </p:txBody>
       </p:sp>
+      <p:sp>
+        <p:nvSpPr>
+          <p:cNvPr id="11" name="TextBox 10">
+            <a:extLst>
+              <a:ext uri="{FF2B5EF4-FFF2-40B4-BE49-F238E27FC236}">
+                <a16:creationId xmlns:a16="http://schemas.microsoft.com/office/drawing/2014/main" id="{1F25C690-F919-2C24-FF7B-69CF25B74724}"/>
+              </a:ext>
+            </a:extLst>
+          </p:cNvPr>
+          <p:cNvSpPr txBox="1"/>
+          <p:nvPr/>
+        </p:nvSpPr>
+        <p:spPr>
+          <a:xfrm>
+            <a:off x="0" y="0"/>
+            <a:ext cx="9536585" cy="369332"/>
+          </a:xfrm>
+          <a:prstGeom prst="rect">
+            <a:avLst/>
+          </a:prstGeom>
+          <a:noFill/>
+        </p:spPr>
+        <p:txBody>
+          <a:bodyPr wrap="none" rtlCol="0">
+            <a:spAutoFit/>
+          </a:bodyPr>
+          <a:lstStyle/>
+          <a:p>
+            <a:r>
+              <a:rPr lang="en-US" b="1" dirty="0"/>
+              <a:t>GSE120575: PENCIL result (</a:t>
+            </a:r>
+            <a:r>
+              <a:rPr lang="en-US" b="1" dirty="0">
+                <a:solidFill>
+                  <a:srgbClr val="FF0000"/>
+                </a:solidFill>
+                <a:highlight>
+                  <a:srgbClr val="FFFF00"/>
+                </a:highlight>
+              </a:rPr>
+              <a:t>corrected result: still CANNOT reproduce </a:t>
+            </a:r>
+            <a:r>
+              <a:rPr lang="en-US" b="1">
+                <a:solidFill>
+                  <a:srgbClr val="FF0000"/>
+                </a:solidFill>
+                <a:highlight>
+                  <a:srgbClr val="FFFF00"/>
+                </a:highlight>
+              </a:rPr>
+              <a:t>the result in the PENCIL paper</a:t>
+            </a:r>
+            <a:r>
+              <a:rPr lang="en-US" b="1"/>
+              <a:t>)</a:t>
+            </a:r>
+            <a:endParaRPr lang="en-US" b="1" dirty="0"/>
+          </a:p>
+        </p:txBody>
+      </p:sp>
+      <p:sp>
+        <p:nvSpPr>
+          <p:cNvPr id="20" name="TextBox 19">
+            <a:extLst>
+              <a:ext uri="{FF2B5EF4-FFF2-40B4-BE49-F238E27FC236}">
+                <a16:creationId xmlns:a16="http://schemas.microsoft.com/office/drawing/2014/main" id="{DD51913F-6366-9848-8726-687278A3C452}"/>
+              </a:ext>
+            </a:extLst>
+          </p:cNvPr>
+          <p:cNvSpPr txBox="1"/>
+          <p:nvPr/>
+        </p:nvSpPr>
+        <p:spPr>
+          <a:xfrm>
+            <a:off x="1159367" y="4794838"/>
+            <a:ext cx="1994457" cy="646331"/>
+          </a:xfrm>
+          <a:prstGeom prst="rect">
+            <a:avLst/>
+          </a:prstGeom>
+          <a:noFill/>
+        </p:spPr>
+        <p:txBody>
+          <a:bodyPr wrap="none" rtlCol="0">
+            <a:spAutoFit/>
+          </a:bodyPr>
+          <a:lstStyle/>
+          <a:p>
+            <a:r>
+              <a:rPr lang="en-US" dirty="0"/>
+              <a:t>Tissue CD8T</a:t>
+            </a:r>
+          </a:p>
+          <a:p>
+            <a:r>
+              <a:rPr lang="en-US" dirty="0"/>
+              <a:t>(use original anno.)</a:t>
+            </a:r>
+          </a:p>
+        </p:txBody>
+      </p:sp>
+      <p:sp>
+        <p:nvSpPr>
+          <p:cNvPr id="21" name="TextBox 20">
+            <a:extLst>
+              <a:ext uri="{FF2B5EF4-FFF2-40B4-BE49-F238E27FC236}">
+                <a16:creationId xmlns:a16="http://schemas.microsoft.com/office/drawing/2014/main" id="{8C2981F6-A234-672E-CF26-9BDF1CE6630E}"/>
+              </a:ext>
+            </a:extLst>
+          </p:cNvPr>
+          <p:cNvSpPr txBox="1"/>
+          <p:nvPr/>
+        </p:nvSpPr>
+        <p:spPr>
+          <a:xfrm>
+            <a:off x="8986890" y="4794838"/>
+            <a:ext cx="1406154" cy="369332"/>
+          </a:xfrm>
+          <a:prstGeom prst="rect">
+            <a:avLst/>
+          </a:prstGeom>
+          <a:noFill/>
+        </p:spPr>
+        <p:txBody>
+          <a:bodyPr wrap="none" rtlCol="0">
+            <a:spAutoFit/>
+          </a:bodyPr>
+          <a:lstStyle/>
+          <a:p>
+            <a:r>
+              <a:rPr lang="en-US" dirty="0"/>
+              <a:t>Tissue B cells</a:t>
+            </a:r>
+          </a:p>
+        </p:txBody>
+      </p:sp>
+      <p:sp>
+        <p:nvSpPr>
+          <p:cNvPr id="22" name="TextBox 21">
+            <a:extLst>
+              <a:ext uri="{FF2B5EF4-FFF2-40B4-BE49-F238E27FC236}">
+                <a16:creationId xmlns:a16="http://schemas.microsoft.com/office/drawing/2014/main" id="{8208E409-B222-158F-E29E-3A41B9CEE149}"/>
+              </a:ext>
+            </a:extLst>
+          </p:cNvPr>
+          <p:cNvSpPr txBox="1"/>
+          <p:nvPr/>
+        </p:nvSpPr>
+        <p:spPr>
+          <a:xfrm>
+            <a:off x="5128591" y="4794838"/>
+            <a:ext cx="1314784" cy="369332"/>
+          </a:xfrm>
+          <a:prstGeom prst="rect">
+            <a:avLst/>
+          </a:prstGeom>
+          <a:noFill/>
+        </p:spPr>
+        <p:txBody>
+          <a:bodyPr wrap="none" rtlCol="0">
+            <a:spAutoFit/>
+          </a:bodyPr>
+          <a:lstStyle/>
+          <a:p>
+            <a:r>
+              <a:rPr lang="en-US" dirty="0"/>
+              <a:t>Tissue CD4T</a:t>
+            </a:r>
+          </a:p>
+        </p:txBody>
+      </p:sp>
+      <p:pic>
+        <p:nvPicPr>
+          <p:cNvPr id="5" name="Picture 4">
+            <a:extLst>
+              <a:ext uri="{FF2B5EF4-FFF2-40B4-BE49-F238E27FC236}">
+                <a16:creationId xmlns:a16="http://schemas.microsoft.com/office/drawing/2014/main" id="{7FA9052C-A2F7-CB80-BE07-22FE2C266519}"/>
+              </a:ext>
+            </a:extLst>
+          </p:cNvPr>
+          <p:cNvPicPr>
+            <a:picLocks noChangeAspect="1"/>
+          </p:cNvPicPr>
+          <p:nvPr/>
+        </p:nvPicPr>
+        <p:blipFill>
+          <a:blip r:embed="rId2">
+            <a:extLst>
+              <a:ext uri="{28A0092B-C50C-407E-A947-70E740481C1C}">
+                <a14:useLocalDpi xmlns:a14="http://schemas.microsoft.com/office/drawing/2010/main" val="0"/>
+              </a:ext>
+            </a:extLst>
+          </a:blip>
+          <a:stretch>
+            <a:fillRect/>
+          </a:stretch>
+        </p:blipFill>
+        <p:spPr>
+          <a:xfrm>
+            <a:off x="958983" y="1836183"/>
+            <a:ext cx="3093057" cy="2743200"/>
+          </a:xfrm>
+          <a:prstGeom prst="rect">
+            <a:avLst/>
+          </a:prstGeom>
+        </p:spPr>
+      </p:pic>
+      <p:pic>
+        <p:nvPicPr>
+          <p:cNvPr id="8" name="Picture 7">
+            <a:extLst>
+              <a:ext uri="{FF2B5EF4-FFF2-40B4-BE49-F238E27FC236}">
+                <a16:creationId xmlns:a16="http://schemas.microsoft.com/office/drawing/2014/main" id="{3531263C-19F2-C66E-5270-B2EF10E19D36}"/>
+              </a:ext>
+            </a:extLst>
+          </p:cNvPr>
+          <p:cNvPicPr>
+            <a:picLocks noChangeAspect="1"/>
+          </p:cNvPicPr>
+          <p:nvPr/>
+        </p:nvPicPr>
+        <p:blipFill>
+          <a:blip r:embed="rId3">
+            <a:extLst>
+              <a:ext uri="{28A0092B-C50C-407E-A947-70E740481C1C}">
+                <a14:useLocalDpi xmlns:a14="http://schemas.microsoft.com/office/drawing/2010/main" val="0"/>
+              </a:ext>
+            </a:extLst>
+          </a:blip>
+          <a:stretch>
+            <a:fillRect/>
+          </a:stretch>
+        </p:blipFill>
+        <p:spPr>
+          <a:xfrm>
+            <a:off x="4543395" y="1836183"/>
+            <a:ext cx="3112168" cy="2743200"/>
+          </a:xfrm>
+          <a:prstGeom prst="rect">
+            <a:avLst/>
+          </a:prstGeom>
+        </p:spPr>
+      </p:pic>
+      <p:pic>
+        <p:nvPicPr>
+          <p:cNvPr id="10" name="Picture 9">
+            <a:extLst>
+              <a:ext uri="{FF2B5EF4-FFF2-40B4-BE49-F238E27FC236}">
+                <a16:creationId xmlns:a16="http://schemas.microsoft.com/office/drawing/2014/main" id="{D6C14DBC-B173-D21D-A552-A72D6E72B49C}"/>
+              </a:ext>
+            </a:extLst>
+          </p:cNvPr>
+          <p:cNvPicPr>
+            <a:picLocks noChangeAspect="1"/>
+          </p:cNvPicPr>
+          <p:nvPr/>
+        </p:nvPicPr>
+        <p:blipFill>
+          <a:blip r:embed="rId4">
+            <a:extLst>
+              <a:ext uri="{28A0092B-C50C-407E-A947-70E740481C1C}">
+                <a14:useLocalDpi xmlns:a14="http://schemas.microsoft.com/office/drawing/2010/main" val="0"/>
+              </a:ext>
+            </a:extLst>
+          </a:blip>
+          <a:stretch>
+            <a:fillRect/>
+          </a:stretch>
+        </p:blipFill>
+        <p:spPr>
+          <a:xfrm>
+            <a:off x="8146917" y="1836183"/>
+            <a:ext cx="3086100" cy="2743200"/>
+          </a:xfrm>
+          <a:prstGeom prst="rect">
+            <a:avLst/>
+          </a:prstGeom>
+        </p:spPr>
+      </p:pic>
     </p:spTree>
     <p:extLst>
       <p:ext uri="{BB962C8B-B14F-4D97-AF65-F5344CB8AC3E}">
-        <p14:creationId xmlns:p14="http://schemas.microsoft.com/office/powerpoint/2010/main" val="2046797108"/>
+        <p14:creationId xmlns:p14="http://schemas.microsoft.com/office/powerpoint/2010/main" val="3000899341"/>
       </p:ext>
     </p:extLst>
   </p:cSld>
@@ -4299,7 +5073,7 @@
     </p:spTree>
     <p:extLst>
       <p:ext uri="{BB962C8B-B14F-4D97-AF65-F5344CB8AC3E}">
-        <p14:creationId xmlns:p14="http://schemas.microsoft.com/office/powerpoint/2010/main" val="1708610594"/>
+        <p14:creationId xmlns:p14="http://schemas.microsoft.com/office/powerpoint/2010/main" val="3583755307"/>
       </p:ext>
     </p:extLst>
   </p:cSld>
@@ -4358,7 +5132,7 @@
     </p:spTree>
     <p:extLst>
       <p:ext uri="{BB962C8B-B14F-4D97-AF65-F5344CB8AC3E}">
-        <p14:creationId xmlns:p14="http://schemas.microsoft.com/office/powerpoint/2010/main" val="1745059043"/>
+        <p14:creationId xmlns:p14="http://schemas.microsoft.com/office/powerpoint/2010/main" val="2046797108"/>
       </p:ext>
     </p:extLst>
   </p:cSld>
@@ -4417,7 +5191,7 @@
     </p:spTree>
     <p:extLst>
       <p:ext uri="{BB962C8B-B14F-4D97-AF65-F5344CB8AC3E}">
-        <p14:creationId xmlns:p14="http://schemas.microsoft.com/office/powerpoint/2010/main" val="323176756"/>
+        <p14:creationId xmlns:p14="http://schemas.microsoft.com/office/powerpoint/2010/main" val="1708610594"/>
       </p:ext>
     </p:extLst>
   </p:cSld>
@@ -4468,6 +5242,124 @@
             <a:fld id="{AD169837-3143-44FA-94C6-B5220B265883}" type="slidenum">
               <a:rPr lang="en-US" smtClean="0"/>
               <a:t>16</a:t>
+            </a:fld>
+            <a:endParaRPr lang="en-US"/>
+          </a:p>
+        </p:txBody>
+      </p:sp>
+    </p:spTree>
+    <p:extLst>
+      <p:ext uri="{BB962C8B-B14F-4D97-AF65-F5344CB8AC3E}">
+        <p14:creationId xmlns:p14="http://schemas.microsoft.com/office/powerpoint/2010/main" val="1745059043"/>
+      </p:ext>
+    </p:extLst>
+  </p:cSld>
+  <p:clrMapOvr>
+    <a:masterClrMapping/>
+  </p:clrMapOvr>
+</p:sld>
+</file>
+
+<file path=ppt/slides/slide17.xml><?xml version="1.0" encoding="utf-8"?>
+<p:sld xmlns:a="http://schemas.openxmlformats.org/drawingml/2006/main" xmlns:r="http://schemas.openxmlformats.org/officeDocument/2006/relationships" xmlns:p="http://schemas.openxmlformats.org/presentationml/2006/main">
+  <p:cSld>
+    <p:spTree>
+      <p:nvGrpSpPr>
+        <p:cNvPr id="1" name=""/>
+        <p:cNvGrpSpPr/>
+        <p:nvPr/>
+      </p:nvGrpSpPr>
+      <p:grpSpPr>
+        <a:xfrm>
+          <a:off x="0" y="0"/>
+          <a:ext cx="0" cy="0"/>
+          <a:chOff x="0" y="0"/>
+          <a:chExt cx="0" cy="0"/>
+        </a:xfrm>
+      </p:grpSpPr>
+      <p:sp>
+        <p:nvSpPr>
+          <p:cNvPr id="4" name="Slide Number Placeholder 3">
+            <a:extLst>
+              <a:ext uri="{FF2B5EF4-FFF2-40B4-BE49-F238E27FC236}">
+                <a16:creationId xmlns:a16="http://schemas.microsoft.com/office/drawing/2014/main" id="{AC30DC80-BEDF-8372-4083-7520A3AD657E}"/>
+              </a:ext>
+            </a:extLst>
+          </p:cNvPr>
+          <p:cNvSpPr>
+            <a:spLocks noGrp="1"/>
+          </p:cNvSpPr>
+          <p:nvPr>
+            <p:ph type="sldNum" sz="quarter" idx="12"/>
+          </p:nvPr>
+        </p:nvSpPr>
+        <p:spPr/>
+        <p:txBody>
+          <a:bodyPr/>
+          <a:lstStyle/>
+          <a:p>
+            <a:fld id="{AD169837-3143-44FA-94C6-B5220B265883}" type="slidenum">
+              <a:rPr lang="en-US" smtClean="0"/>
+              <a:t>17</a:t>
+            </a:fld>
+            <a:endParaRPr lang="en-US"/>
+          </a:p>
+        </p:txBody>
+      </p:sp>
+    </p:spTree>
+    <p:extLst>
+      <p:ext uri="{BB962C8B-B14F-4D97-AF65-F5344CB8AC3E}">
+        <p14:creationId xmlns:p14="http://schemas.microsoft.com/office/powerpoint/2010/main" val="323176756"/>
+      </p:ext>
+    </p:extLst>
+  </p:cSld>
+  <p:clrMapOvr>
+    <a:masterClrMapping/>
+  </p:clrMapOvr>
+</p:sld>
+</file>
+
+<file path=ppt/slides/slide18.xml><?xml version="1.0" encoding="utf-8"?>
+<p:sld xmlns:a="http://schemas.openxmlformats.org/drawingml/2006/main" xmlns:r="http://schemas.openxmlformats.org/officeDocument/2006/relationships" xmlns:p="http://schemas.openxmlformats.org/presentationml/2006/main">
+  <p:cSld>
+    <p:spTree>
+      <p:nvGrpSpPr>
+        <p:cNvPr id="1" name=""/>
+        <p:cNvGrpSpPr/>
+        <p:nvPr/>
+      </p:nvGrpSpPr>
+      <p:grpSpPr>
+        <a:xfrm>
+          <a:off x="0" y="0"/>
+          <a:ext cx="0" cy="0"/>
+          <a:chOff x="0" y="0"/>
+          <a:chExt cx="0" cy="0"/>
+        </a:xfrm>
+      </p:grpSpPr>
+      <p:sp>
+        <p:nvSpPr>
+          <p:cNvPr id="4" name="Slide Number Placeholder 3">
+            <a:extLst>
+              <a:ext uri="{FF2B5EF4-FFF2-40B4-BE49-F238E27FC236}">
+                <a16:creationId xmlns:a16="http://schemas.microsoft.com/office/drawing/2014/main" id="{AC30DC80-BEDF-8372-4083-7520A3AD657E}"/>
+              </a:ext>
+            </a:extLst>
+          </p:cNvPr>
+          <p:cNvSpPr>
+            <a:spLocks noGrp="1"/>
+          </p:cNvSpPr>
+          <p:nvPr>
+            <p:ph type="sldNum" sz="quarter" idx="12"/>
+          </p:nvPr>
+        </p:nvSpPr>
+        <p:spPr/>
+        <p:txBody>
+          <a:bodyPr/>
+          <a:lstStyle/>
+          <a:p>
+            <a:fld id="{AD169837-3143-44FA-94C6-B5220B265883}" type="slidenum">
+              <a:rPr lang="en-US" smtClean="0"/>
+              <a:t>18</a:t>
             </a:fld>
             <a:endParaRPr lang="en-US"/>
           </a:p>

</xml_diff>